<commit_message>
Made gif for prez + diapo and poster
</commit_message>
<xml_diff>
--- a/Rapport/ISC_EMB_ceremonie_diplome_Mariot_Bechevet_2025.pptx
+++ b/Rapport/ISC_EMB_ceremonie_diplome_Mariot_Bechevet_2025.pptx
@@ -226,7 +226,7 @@
           <a:p>
             <a:fld id="{7DE35D8A-043F-1A4C-8755-955935A64998}" type="datetimeFigureOut">
               <a:rPr lang="fr-FR" smtClean="0"/>
-              <a:t>18/08/2025</a:t>
+              <a:t>22/08/2025</a:t>
             </a:fld>
             <a:endParaRPr lang="fr-FR"/>
           </a:p>
@@ -403,7 +403,7 @@
           <a:p>
             <a:fld id="{EDB78CA8-3C0C-450E-A9A8-1BF427B2CF19}" type="datetimeFigureOut">
               <a:rPr lang="fr-CH" smtClean="0"/>
-              <a:t>18.08.2025</a:t>
+              <a:t>22.08.2025</a:t>
             </a:fld>
             <a:endParaRPr lang="fr-CH"/>
           </a:p>
@@ -1821,7 +1821,12 @@
             <a:fillRect/>
           </a:stretch>
         </p:blipFill>
-        <p:spPr/>
+        <p:spPr>
+          <a:xfrm>
+            <a:off x="228405" y="766300"/>
+            <a:ext cx="5519418" cy="4201834"/>
+          </a:xfrm>
+        </p:spPr>
       </p:pic>
       <p:pic>
         <p:nvPicPr>

</xml_diff>